<commit_message>
working on OSF und Box2
</commit_message>
<xml_diff>
--- a/PRIME/PRIME_experiments.pptx
+++ b/PRIME/PRIME_experiments.pptx
@@ -206,7 +206,7 @@
           <a:p>
             <a:fld id="{B061A044-314D-4329-9682-F6176F300576}" type="datetimeFigureOut">
               <a:rPr lang="en-US" smtClean="0"/>
-              <a:t>7/7/2024</a:t>
+              <a:t>7/8/2024</a:t>
             </a:fld>
             <a:endParaRPr lang="en-US"/>
           </a:p>
@@ -791,7 +791,7 @@
           <a:p>
             <a:fld id="{7733AE6D-9644-4FC2-AE05-59B9DC610BB8}" type="datetimeFigureOut">
               <a:rPr lang="en-US" smtClean="0"/>
-              <a:t>7/7/2024</a:t>
+              <a:t>7/8/2024</a:t>
             </a:fld>
             <a:endParaRPr lang="en-US"/>
           </a:p>
@@ -991,7 +991,7 @@
           <a:p>
             <a:fld id="{7733AE6D-9644-4FC2-AE05-59B9DC610BB8}" type="datetimeFigureOut">
               <a:rPr lang="en-US" smtClean="0"/>
-              <a:t>7/7/2024</a:t>
+              <a:t>7/8/2024</a:t>
             </a:fld>
             <a:endParaRPr lang="en-US"/>
           </a:p>
@@ -1201,7 +1201,7 @@
           <a:p>
             <a:fld id="{7733AE6D-9644-4FC2-AE05-59B9DC610BB8}" type="datetimeFigureOut">
               <a:rPr lang="en-US" smtClean="0"/>
-              <a:t>7/7/2024</a:t>
+              <a:t>7/8/2024</a:t>
             </a:fld>
             <a:endParaRPr lang="en-US"/>
           </a:p>
@@ -1401,7 +1401,7 @@
           <a:p>
             <a:fld id="{7733AE6D-9644-4FC2-AE05-59B9DC610BB8}" type="datetimeFigureOut">
               <a:rPr lang="en-US" smtClean="0"/>
-              <a:t>7/7/2024</a:t>
+              <a:t>7/8/2024</a:t>
             </a:fld>
             <a:endParaRPr lang="en-US"/>
           </a:p>
@@ -1677,7 +1677,7 @@
           <a:p>
             <a:fld id="{7733AE6D-9644-4FC2-AE05-59B9DC610BB8}" type="datetimeFigureOut">
               <a:rPr lang="en-US" smtClean="0"/>
-              <a:t>7/7/2024</a:t>
+              <a:t>7/8/2024</a:t>
             </a:fld>
             <a:endParaRPr lang="en-US"/>
           </a:p>
@@ -1945,7 +1945,7 @@
           <a:p>
             <a:fld id="{7733AE6D-9644-4FC2-AE05-59B9DC610BB8}" type="datetimeFigureOut">
               <a:rPr lang="en-US" smtClean="0"/>
-              <a:t>7/7/2024</a:t>
+              <a:t>7/8/2024</a:t>
             </a:fld>
             <a:endParaRPr lang="en-US"/>
           </a:p>
@@ -2360,7 +2360,7 @@
           <a:p>
             <a:fld id="{7733AE6D-9644-4FC2-AE05-59B9DC610BB8}" type="datetimeFigureOut">
               <a:rPr lang="en-US" smtClean="0"/>
-              <a:t>7/7/2024</a:t>
+              <a:t>7/8/2024</a:t>
             </a:fld>
             <a:endParaRPr lang="en-US"/>
           </a:p>
@@ -2502,7 +2502,7 @@
           <a:p>
             <a:fld id="{7733AE6D-9644-4FC2-AE05-59B9DC610BB8}" type="datetimeFigureOut">
               <a:rPr lang="en-US" smtClean="0"/>
-              <a:t>7/7/2024</a:t>
+              <a:t>7/8/2024</a:t>
             </a:fld>
             <a:endParaRPr lang="en-US"/>
           </a:p>
@@ -2615,7 +2615,7 @@
           <a:p>
             <a:fld id="{7733AE6D-9644-4FC2-AE05-59B9DC610BB8}" type="datetimeFigureOut">
               <a:rPr lang="en-US" smtClean="0"/>
-              <a:t>7/7/2024</a:t>
+              <a:t>7/8/2024</a:t>
             </a:fld>
             <a:endParaRPr lang="en-US"/>
           </a:p>
@@ -2928,7 +2928,7 @@
           <a:p>
             <a:fld id="{7733AE6D-9644-4FC2-AE05-59B9DC610BB8}" type="datetimeFigureOut">
               <a:rPr lang="en-US" smtClean="0"/>
-              <a:t>7/7/2024</a:t>
+              <a:t>7/8/2024</a:t>
             </a:fld>
             <a:endParaRPr lang="en-US"/>
           </a:p>
@@ -3217,7 +3217,7 @@
           <a:p>
             <a:fld id="{7733AE6D-9644-4FC2-AE05-59B9DC610BB8}" type="datetimeFigureOut">
               <a:rPr lang="en-US" smtClean="0"/>
-              <a:t>7/7/2024</a:t>
+              <a:t>7/8/2024</a:t>
             </a:fld>
             <a:endParaRPr lang="en-US"/>
           </a:p>
@@ -3460,7 +3460,7 @@
           <a:p>
             <a:fld id="{7733AE6D-9644-4FC2-AE05-59B9DC610BB8}" type="datetimeFigureOut">
               <a:rPr lang="en-US" smtClean="0"/>
-              <a:t>7/7/2024</a:t>
+              <a:t>7/8/2024</a:t>
             </a:fld>
             <a:endParaRPr lang="en-US"/>
           </a:p>
@@ -4093,7 +4093,7 @@
         </p:nvGraphicFramePr>
         <p:xfrm>
           <a:off x="1372042" y="2047534"/>
-          <a:ext cx="9370170" cy="3759200"/>
+          <a:ext cx="9370170" cy="3576320"/>
         </p:xfrm>
         <a:graphic>
           <a:graphicData uri="http://schemas.openxmlformats.org/drawingml/2006/table">
@@ -8897,6 +8897,14 @@
             </a:r>
             <a:r>
               <a:rPr lang="de-DE" sz="1800" dirty="0"/>
+              <a:t> </a:t>
+            </a:r>
+            <a:r>
+              <a:rPr lang="de-DE" sz="1800" dirty="0" err="1"/>
+              <a:t>with</a:t>
+            </a:r>
+            <a:r>
+              <a:rPr lang="de-DE" sz="1800" dirty="0"/>
               <a:t> „</a:t>
             </a:r>
             <a:r>
@@ -9297,7 +9305,17 @@
             </a:r>
             <a:r>
               <a:rPr lang="de-DE" sz="1800" dirty="0"/>
-              <a:t>. :/ </a:t>
+              <a:t>. </a:t>
+            </a:r>
+            <a:r>
+              <a:rPr lang="de-DE" sz="1800" dirty="0">
+                <a:sym typeface="Wingdings" panose="05000000000000000000" pitchFamily="2" charset="2"/>
+              </a:rPr>
+              <a:t></a:t>
+            </a:r>
+            <a:r>
+              <a:rPr lang="de-DE" sz="1800" dirty="0"/>
+              <a:t> </a:t>
             </a:r>
             <a:r>
               <a:rPr lang="de-DE" sz="1800" dirty="0" err="1"/>
@@ -10915,7 +10933,17 @@
           <a:p>
             <a:r>
               <a:rPr lang="de-DE" sz="1800" dirty="0"/>
-              <a:t>Expensive. :/ </a:t>
+              <a:t>Expensive. </a:t>
+            </a:r>
+            <a:r>
+              <a:rPr lang="de-DE" sz="1800" dirty="0">
+                <a:sym typeface="Wingdings" panose="05000000000000000000" pitchFamily="2" charset="2"/>
+              </a:rPr>
+              <a:t></a:t>
+            </a:r>
+            <a:r>
+              <a:rPr lang="de-DE" sz="1800" dirty="0"/>
+              <a:t> </a:t>
             </a:r>
           </a:p>
           <a:p>
@@ -10996,7 +11024,7 @@
             </a:r>
             <a:r>
               <a:rPr lang="de-DE" sz="1800" dirty="0"/>
-              <a:t>, </a:t>
+              <a:t>? </a:t>
             </a:r>
             <a:r>
               <a:rPr lang="de-DE" sz="1800" dirty="0" err="1"/>
@@ -11074,7 +11102,10 @@
               <a:rPr lang="de-DE" sz="1800" dirty="0" err="1"/>
               <a:t>correctly</a:t>
             </a:r>
-            <a:endParaRPr lang="de-DE" sz="1800" dirty="0"/>
+            <a:r>
+              <a:rPr lang="de-DE" sz="1800" dirty="0"/>
+              <a:t>?</a:t>
+            </a:r>
           </a:p>
           <a:p>
             <a:r>

</xml_diff>

<commit_message>
after talk about prime with nadine and carolyn
</commit_message>
<xml_diff>
--- a/PRIME/PRIME_experiments.pptx
+++ b/PRIME/PRIME_experiments.pptx
@@ -206,7 +206,7 @@
           <a:p>
             <a:fld id="{B061A044-314D-4329-9682-F6176F300576}" type="datetimeFigureOut">
               <a:rPr lang="en-US" smtClean="0"/>
-              <a:t>7/8/2024</a:t>
+              <a:t>7/9/2024</a:t>
             </a:fld>
             <a:endParaRPr lang="en-US"/>
           </a:p>
@@ -518,7 +518,71 @@
           <a:bodyPr/>
           <a:lstStyle/>
           <a:p>
-            <a:endParaRPr lang="en-US" dirty="0"/>
+            <a:r>
+              <a:rPr lang="de-DE" dirty="0"/>
+              <a:t>Find </a:t>
+            </a:r>
+            <a:r>
+              <a:rPr lang="de-DE" dirty="0" err="1"/>
+              <a:t>one</a:t>
+            </a:r>
+            <a:r>
+              <a:rPr lang="de-DE" dirty="0"/>
+              <a:t> </a:t>
+            </a:r>
+            <a:r>
+              <a:rPr lang="de-DE" dirty="0" err="1"/>
+              <a:t>paper</a:t>
+            </a:r>
+            <a:r>
+              <a:rPr lang="de-DE" dirty="0"/>
+              <a:t> </a:t>
+            </a:r>
+            <a:r>
+              <a:rPr lang="de-DE" dirty="0" err="1"/>
+              <a:t>that</a:t>
+            </a:r>
+            <a:r>
+              <a:rPr lang="de-DE" dirty="0"/>
+              <a:t> </a:t>
+            </a:r>
+            <a:r>
+              <a:rPr lang="de-DE" dirty="0" err="1"/>
+              <a:t>looks</a:t>
+            </a:r>
+            <a:r>
+              <a:rPr lang="de-DE" dirty="0"/>
+              <a:t> like 2-3 </a:t>
+            </a:r>
+            <a:r>
+              <a:rPr lang="de-DE" dirty="0" err="1"/>
+              <a:t>weeks</a:t>
+            </a:r>
+            <a:r>
+              <a:rPr lang="de-DE" dirty="0"/>
+              <a:t> and </a:t>
+            </a:r>
+            <a:r>
+              <a:rPr lang="de-DE" dirty="0" err="1"/>
+              <a:t>then</a:t>
+            </a:r>
+            <a:r>
+              <a:rPr lang="de-DE" dirty="0"/>
+              <a:t> </a:t>
+            </a:r>
+            <a:r>
+              <a:rPr lang="de-DE" dirty="0" err="1"/>
+              <a:t>cite</a:t>
+            </a:r>
+            <a:r>
+              <a:rPr lang="de-DE" dirty="0"/>
+              <a:t> </a:t>
+            </a:r>
+            <a:r>
+              <a:rPr lang="de-DE" dirty="0" err="1"/>
+              <a:t>this</a:t>
+            </a:r>
+            <a:endParaRPr lang="de-DE" dirty="0"/>
           </a:p>
         </p:txBody>
       </p:sp>
@@ -539,6 +603,111 @@
           <a:p>
             <a:fld id="{66897254-8802-4506-9D03-E17E865AF476}" type="slidenum">
               <a:rPr lang="en-US" smtClean="0"/>
+              <a:t>8</a:t>
+            </a:fld>
+            <a:endParaRPr lang="en-US"/>
+          </a:p>
+        </p:txBody>
+      </p:sp>
+    </p:spTree>
+    <p:extLst>
+      <p:ext uri="{BB962C8B-B14F-4D97-AF65-F5344CB8AC3E}">
+        <p14:creationId xmlns:p14="http://schemas.microsoft.com/office/powerpoint/2010/main" val="3069400372"/>
+      </p:ext>
+    </p:extLst>
+  </p:cSld>
+  <p:clrMapOvr>
+    <a:masterClrMapping/>
+  </p:clrMapOvr>
+</p:notes>
+</file>
+
+<file path=ppt/notesSlides/notesSlide2.xml><?xml version="1.0" encoding="utf-8"?>
+<p:notes xmlns:a="http://schemas.openxmlformats.org/drawingml/2006/main" xmlns:r="http://schemas.openxmlformats.org/officeDocument/2006/relationships" xmlns:p="http://schemas.openxmlformats.org/presentationml/2006/main">
+  <p:cSld>
+    <p:spTree>
+      <p:nvGrpSpPr>
+        <p:cNvPr id="1" name=""/>
+        <p:cNvGrpSpPr/>
+        <p:nvPr/>
+      </p:nvGrpSpPr>
+      <p:grpSpPr>
+        <a:xfrm>
+          <a:off x="0" y="0"/>
+          <a:ext cx="0" cy="0"/>
+          <a:chOff x="0" y="0"/>
+          <a:chExt cx="0" cy="0"/>
+        </a:xfrm>
+      </p:grpSpPr>
+      <p:sp>
+        <p:nvSpPr>
+          <p:cNvPr id="2" name="Folienbildplatzhalter 1"/>
+          <p:cNvSpPr>
+            <a:spLocks noGrp="1" noRot="1" noChangeAspect="1"/>
+          </p:cNvSpPr>
+          <p:nvPr>
+            <p:ph type="sldImg"/>
+          </p:nvPr>
+        </p:nvSpPr>
+        <p:spPr/>
+      </p:sp>
+      <p:sp>
+        <p:nvSpPr>
+          <p:cNvPr id="3" name="Notizenplatzhalter 2"/>
+          <p:cNvSpPr>
+            <a:spLocks noGrp="1"/>
+          </p:cNvSpPr>
+          <p:nvPr>
+            <p:ph type="body" idx="1"/>
+          </p:nvPr>
+        </p:nvSpPr>
+        <p:spPr/>
+        <p:txBody>
+          <a:bodyPr/>
+          <a:lstStyle/>
+          <a:p>
+            <a:r>
+              <a:rPr lang="en-US" dirty="0"/>
+              <a:t>Maybe lab exp, 1 hours</a:t>
+            </a:r>
+          </a:p>
+          <a:p>
+            <a:endParaRPr lang="en-US" dirty="0"/>
+          </a:p>
+          <a:p>
+            <a:r>
+              <a:rPr lang="en-US" dirty="0"/>
+              <a:t>3 sessions</a:t>
+            </a:r>
+          </a:p>
+          <a:p>
+            <a:r>
+              <a:rPr lang="en-US" dirty="0"/>
+              <a:t>1, next day, 3 weeks</a:t>
+            </a:r>
+          </a:p>
+          <a:p>
+            <a:endParaRPr lang="en-US" dirty="0"/>
+          </a:p>
+        </p:txBody>
+      </p:sp>
+      <p:sp>
+        <p:nvSpPr>
+          <p:cNvPr id="4" name="Foliennummernplatzhalter 3"/>
+          <p:cNvSpPr>
+            <a:spLocks noGrp="1"/>
+          </p:cNvSpPr>
+          <p:nvPr>
+            <p:ph type="sldNum" sz="quarter" idx="5"/>
+          </p:nvPr>
+        </p:nvSpPr>
+        <p:spPr/>
+        <p:txBody>
+          <a:bodyPr/>
+          <a:lstStyle/>
+          <a:p>
+            <a:fld id="{66897254-8802-4506-9D03-E17E865AF476}" type="slidenum">
+              <a:rPr lang="en-US" smtClean="0"/>
               <a:t>9</a:t>
             </a:fld>
             <a:endParaRPr lang="en-US"/>
@@ -558,7 +727,7 @@
 </p:notes>
 </file>
 
-<file path=ppt/notesSlides/notesSlide2.xml><?xml version="1.0" encoding="utf-8"?>
+<file path=ppt/notesSlides/notesSlide3.xml><?xml version="1.0" encoding="utf-8"?>
 <p:notes xmlns:a="http://schemas.openxmlformats.org/drawingml/2006/main" xmlns:r="http://schemas.openxmlformats.org/officeDocument/2006/relationships" xmlns:p="http://schemas.openxmlformats.org/presentationml/2006/main">
   <p:cSld>
     <p:spTree>
@@ -791,7 +960,7 @@
           <a:p>
             <a:fld id="{7733AE6D-9644-4FC2-AE05-59B9DC610BB8}" type="datetimeFigureOut">
               <a:rPr lang="en-US" smtClean="0"/>
-              <a:t>7/8/2024</a:t>
+              <a:t>7/9/2024</a:t>
             </a:fld>
             <a:endParaRPr lang="en-US"/>
           </a:p>
@@ -991,7 +1160,7 @@
           <a:p>
             <a:fld id="{7733AE6D-9644-4FC2-AE05-59B9DC610BB8}" type="datetimeFigureOut">
               <a:rPr lang="en-US" smtClean="0"/>
-              <a:t>7/8/2024</a:t>
+              <a:t>7/9/2024</a:t>
             </a:fld>
             <a:endParaRPr lang="en-US"/>
           </a:p>
@@ -1201,7 +1370,7 @@
           <a:p>
             <a:fld id="{7733AE6D-9644-4FC2-AE05-59B9DC610BB8}" type="datetimeFigureOut">
               <a:rPr lang="en-US" smtClean="0"/>
-              <a:t>7/8/2024</a:t>
+              <a:t>7/9/2024</a:t>
             </a:fld>
             <a:endParaRPr lang="en-US"/>
           </a:p>
@@ -1401,7 +1570,7 @@
           <a:p>
             <a:fld id="{7733AE6D-9644-4FC2-AE05-59B9DC610BB8}" type="datetimeFigureOut">
               <a:rPr lang="en-US" smtClean="0"/>
-              <a:t>7/8/2024</a:t>
+              <a:t>7/9/2024</a:t>
             </a:fld>
             <a:endParaRPr lang="en-US"/>
           </a:p>
@@ -1677,7 +1846,7 @@
           <a:p>
             <a:fld id="{7733AE6D-9644-4FC2-AE05-59B9DC610BB8}" type="datetimeFigureOut">
               <a:rPr lang="en-US" smtClean="0"/>
-              <a:t>7/8/2024</a:t>
+              <a:t>7/9/2024</a:t>
             </a:fld>
             <a:endParaRPr lang="en-US"/>
           </a:p>
@@ -1945,7 +2114,7 @@
           <a:p>
             <a:fld id="{7733AE6D-9644-4FC2-AE05-59B9DC610BB8}" type="datetimeFigureOut">
               <a:rPr lang="en-US" smtClean="0"/>
-              <a:t>7/8/2024</a:t>
+              <a:t>7/9/2024</a:t>
             </a:fld>
             <a:endParaRPr lang="en-US"/>
           </a:p>
@@ -2360,7 +2529,7 @@
           <a:p>
             <a:fld id="{7733AE6D-9644-4FC2-AE05-59B9DC610BB8}" type="datetimeFigureOut">
               <a:rPr lang="en-US" smtClean="0"/>
-              <a:t>7/8/2024</a:t>
+              <a:t>7/9/2024</a:t>
             </a:fld>
             <a:endParaRPr lang="en-US"/>
           </a:p>
@@ -2502,7 +2671,7 @@
           <a:p>
             <a:fld id="{7733AE6D-9644-4FC2-AE05-59B9DC610BB8}" type="datetimeFigureOut">
               <a:rPr lang="en-US" smtClean="0"/>
-              <a:t>7/8/2024</a:t>
+              <a:t>7/9/2024</a:t>
             </a:fld>
             <a:endParaRPr lang="en-US"/>
           </a:p>
@@ -2615,7 +2784,7 @@
           <a:p>
             <a:fld id="{7733AE6D-9644-4FC2-AE05-59B9DC610BB8}" type="datetimeFigureOut">
               <a:rPr lang="en-US" smtClean="0"/>
-              <a:t>7/8/2024</a:t>
+              <a:t>7/9/2024</a:t>
             </a:fld>
             <a:endParaRPr lang="en-US"/>
           </a:p>
@@ -2928,7 +3097,7 @@
           <a:p>
             <a:fld id="{7733AE6D-9644-4FC2-AE05-59B9DC610BB8}" type="datetimeFigureOut">
               <a:rPr lang="en-US" smtClean="0"/>
-              <a:t>7/8/2024</a:t>
+              <a:t>7/9/2024</a:t>
             </a:fld>
             <a:endParaRPr lang="en-US"/>
           </a:p>
@@ -3217,7 +3386,7 @@
           <a:p>
             <a:fld id="{7733AE6D-9644-4FC2-AE05-59B9DC610BB8}" type="datetimeFigureOut">
               <a:rPr lang="en-US" smtClean="0"/>
-              <a:t>7/8/2024</a:t>
+              <a:t>7/9/2024</a:t>
             </a:fld>
             <a:endParaRPr lang="en-US"/>
           </a:p>
@@ -3460,7 +3629,7 @@
           <a:p>
             <a:fld id="{7733AE6D-9644-4FC2-AE05-59B9DC610BB8}" type="datetimeFigureOut">
               <a:rPr lang="en-US" smtClean="0"/>
-              <a:t>7/8/2024</a:t>
+              <a:t>7/9/2024</a:t>
             </a:fld>
             <a:endParaRPr lang="en-US"/>
           </a:p>
@@ -5121,7 +5290,7 @@
         <p:spPr/>
         <p:txBody>
           <a:bodyPr>
-            <a:normAutofit/>
+            <a:normAutofit lnSpcReduction="10000"/>
           </a:bodyPr>
           <a:lstStyle/>
           <a:p>
@@ -5435,6 +5604,29 @@
               <a:t>one</a:t>
             </a:r>
             <a:endParaRPr lang="de-DE" dirty="0"/>
+          </a:p>
+          <a:p>
+            <a:pPr marL="514350" indent="-514350">
+              <a:buAutoNum type="arabicPeriod"/>
+            </a:pPr>
+            <a:endParaRPr lang="de-DE" dirty="0"/>
+          </a:p>
+          <a:p>
+            <a:pPr marL="0" indent="0">
+              <a:buNone/>
+            </a:pPr>
+            <a:r>
+              <a:rPr lang="de-DE" dirty="0"/>
+              <a:t>-&gt; switch </a:t>
+            </a:r>
+            <a:r>
+              <a:rPr lang="de-DE" dirty="0" err="1"/>
+              <a:t>studies</a:t>
+            </a:r>
+            <a:r>
+              <a:rPr lang="de-DE" dirty="0"/>
+              <a:t> 1 and 2</a:t>
+            </a:r>
           </a:p>
           <a:p>
             <a:pPr marL="514350" indent="-514350">
@@ -8832,7 +9024,15 @@
             </a:pPr>
             <a:r>
               <a:rPr lang="de-DE" sz="1800" dirty="0"/>
-              <a:t>Design (~60 </a:t>
+              <a:t>Design (</a:t>
+            </a:r>
+            <a:r>
+              <a:rPr lang="de-DE" sz="1800" dirty="0" err="1"/>
+              <a:t>max</a:t>
+            </a:r>
+            <a:r>
+              <a:rPr lang="de-DE" sz="1800" dirty="0"/>
+              <a:t> 45 </a:t>
             </a:r>
             <a:r>
               <a:rPr lang="de-DE" sz="1800" dirty="0" err="1"/>

</xml_diff>

<commit_message>
still working on revision
</commit_message>
<xml_diff>
--- a/PRIME/PRIME_experiments.pptx
+++ b/PRIME/PRIME_experiments.pptx
@@ -206,7 +206,7 @@
           <a:p>
             <a:fld id="{B061A044-314D-4329-9682-F6176F300576}" type="datetimeFigureOut">
               <a:rPr lang="en-US" smtClean="0"/>
-              <a:t>7/9/2024</a:t>
+              <a:t>11/2/2024</a:t>
             </a:fld>
             <a:endParaRPr lang="en-US"/>
           </a:p>
@@ -960,7 +960,7 @@
           <a:p>
             <a:fld id="{7733AE6D-9644-4FC2-AE05-59B9DC610BB8}" type="datetimeFigureOut">
               <a:rPr lang="en-US" smtClean="0"/>
-              <a:t>7/9/2024</a:t>
+              <a:t>11/2/2024</a:t>
             </a:fld>
             <a:endParaRPr lang="en-US"/>
           </a:p>
@@ -1160,7 +1160,7 @@
           <a:p>
             <a:fld id="{7733AE6D-9644-4FC2-AE05-59B9DC610BB8}" type="datetimeFigureOut">
               <a:rPr lang="en-US" smtClean="0"/>
-              <a:t>7/9/2024</a:t>
+              <a:t>11/2/2024</a:t>
             </a:fld>
             <a:endParaRPr lang="en-US"/>
           </a:p>
@@ -1370,7 +1370,7 @@
           <a:p>
             <a:fld id="{7733AE6D-9644-4FC2-AE05-59B9DC610BB8}" type="datetimeFigureOut">
               <a:rPr lang="en-US" smtClean="0"/>
-              <a:t>7/9/2024</a:t>
+              <a:t>11/2/2024</a:t>
             </a:fld>
             <a:endParaRPr lang="en-US"/>
           </a:p>
@@ -1570,7 +1570,7 @@
           <a:p>
             <a:fld id="{7733AE6D-9644-4FC2-AE05-59B9DC610BB8}" type="datetimeFigureOut">
               <a:rPr lang="en-US" smtClean="0"/>
-              <a:t>7/9/2024</a:t>
+              <a:t>11/2/2024</a:t>
             </a:fld>
             <a:endParaRPr lang="en-US"/>
           </a:p>
@@ -1846,7 +1846,7 @@
           <a:p>
             <a:fld id="{7733AE6D-9644-4FC2-AE05-59B9DC610BB8}" type="datetimeFigureOut">
               <a:rPr lang="en-US" smtClean="0"/>
-              <a:t>7/9/2024</a:t>
+              <a:t>11/2/2024</a:t>
             </a:fld>
             <a:endParaRPr lang="en-US"/>
           </a:p>
@@ -2114,7 +2114,7 @@
           <a:p>
             <a:fld id="{7733AE6D-9644-4FC2-AE05-59B9DC610BB8}" type="datetimeFigureOut">
               <a:rPr lang="en-US" smtClean="0"/>
-              <a:t>7/9/2024</a:t>
+              <a:t>11/2/2024</a:t>
             </a:fld>
             <a:endParaRPr lang="en-US"/>
           </a:p>
@@ -2529,7 +2529,7 @@
           <a:p>
             <a:fld id="{7733AE6D-9644-4FC2-AE05-59B9DC610BB8}" type="datetimeFigureOut">
               <a:rPr lang="en-US" smtClean="0"/>
-              <a:t>7/9/2024</a:t>
+              <a:t>11/2/2024</a:t>
             </a:fld>
             <a:endParaRPr lang="en-US"/>
           </a:p>
@@ -2671,7 +2671,7 @@
           <a:p>
             <a:fld id="{7733AE6D-9644-4FC2-AE05-59B9DC610BB8}" type="datetimeFigureOut">
               <a:rPr lang="en-US" smtClean="0"/>
-              <a:t>7/9/2024</a:t>
+              <a:t>11/2/2024</a:t>
             </a:fld>
             <a:endParaRPr lang="en-US"/>
           </a:p>
@@ -2784,7 +2784,7 @@
           <a:p>
             <a:fld id="{7733AE6D-9644-4FC2-AE05-59B9DC610BB8}" type="datetimeFigureOut">
               <a:rPr lang="en-US" smtClean="0"/>
-              <a:t>7/9/2024</a:t>
+              <a:t>11/2/2024</a:t>
             </a:fld>
             <a:endParaRPr lang="en-US"/>
           </a:p>
@@ -3097,7 +3097,7 @@
           <a:p>
             <a:fld id="{7733AE6D-9644-4FC2-AE05-59B9DC610BB8}" type="datetimeFigureOut">
               <a:rPr lang="en-US" smtClean="0"/>
-              <a:t>7/9/2024</a:t>
+              <a:t>11/2/2024</a:t>
             </a:fld>
             <a:endParaRPr lang="en-US"/>
           </a:p>
@@ -3386,7 +3386,7 @@
           <a:p>
             <a:fld id="{7733AE6D-9644-4FC2-AE05-59B9DC610BB8}" type="datetimeFigureOut">
               <a:rPr lang="en-US" smtClean="0"/>
-              <a:t>7/9/2024</a:t>
+              <a:t>11/2/2024</a:t>
             </a:fld>
             <a:endParaRPr lang="en-US"/>
           </a:p>
@@ -3629,7 +3629,7 @@
           <a:p>
             <a:fld id="{7733AE6D-9644-4FC2-AE05-59B9DC610BB8}" type="datetimeFigureOut">
               <a:rPr lang="en-US" smtClean="0"/>
-              <a:t>7/9/2024</a:t>
+              <a:t>11/2/2024</a:t>
             </a:fld>
             <a:endParaRPr lang="en-US"/>
           </a:p>

</xml_diff>